<commit_message>
ppt cloud computing SLA 30032023
</commit_message>
<xml_diff>
--- a/01 Classes/Aula 02 - Computação em Nuvem e Web Services em Linux  Fundamentos 2.pptx
+++ b/01 Classes/Aula 02 - Computação em Nuvem e Web Services em Linux  Fundamentos 2.pptx
@@ -5055,7 +5055,7 @@
         <p:spPr>
           <a:xfrm>
             <a:off x="139472" y="1063230"/>
-            <a:ext cx="8865056" cy="3606305"/>
+            <a:ext cx="8865056" cy="3874290"/>
           </a:xfrm>
         </p:spPr>
         <p:txBody>
@@ -5072,8 +5072,36 @@
                 <a:latin typeface="Times New Roman" panose="02020603050405020304" pitchFamily="18" charset="0"/>
                 <a:cs typeface="Times New Roman" panose="02020603050405020304" pitchFamily="18" charset="0"/>
               </a:rPr>
-              <a:t>Exercícios (Atividade Verificadora de Aprendizagem)</a:t>
-            </a:r>
+              <a:t>0 – Realizar o </a:t>
+            </a:r>
+            <a:r>
+              <a:rPr lang="pt-BR" sz="2000" b="1" dirty="0">
+                <a:latin typeface="Times New Roman" panose="02020603050405020304" pitchFamily="18" charset="0"/>
+                <a:cs typeface="Times New Roman" panose="02020603050405020304" pitchFamily="18" charset="0"/>
+              </a:rPr>
+              <a:t>Acesso Remoto</a:t>
+            </a:r>
+            <a:r>
+              <a:rPr lang="pt-BR" sz="2000" dirty="0">
+                <a:latin typeface="Times New Roman" panose="02020603050405020304" pitchFamily="18" charset="0"/>
+                <a:cs typeface="Times New Roman" panose="02020603050405020304" pitchFamily="18" charset="0"/>
+              </a:rPr>
+              <a:t> </a:t>
+            </a:r>
+            <a:r>
+              <a:rPr lang="pt-BR" sz="2000" b="1" dirty="0">
+                <a:solidFill>
+                  <a:srgbClr val="FF0000"/>
+                </a:solidFill>
+                <a:latin typeface="Times" panose="02020603050405020304" pitchFamily="18" charset="0"/>
+                <a:cs typeface="Times" panose="02020603050405020304" pitchFamily="18" charset="0"/>
+              </a:rPr>
+              <a:t>– Azure Microsoft</a:t>
+            </a:r>
+            <a:endParaRPr lang="pt-BR" sz="2000" dirty="0">
+              <a:latin typeface="Times New Roman" panose="02020603050405020304" pitchFamily="18" charset="0"/>
+              <a:cs typeface="Times New Roman" panose="02020603050405020304" pitchFamily="18" charset="0"/>
+            </a:endParaRPr>
           </a:p>
           <a:p>
             <a:pPr marL="0" indent="0" algn="just">
@@ -5193,35 +5221,6 @@
               </a:rPr>
               <a:t> como Administrador</a:t>
             </a:r>
-          </a:p>
-          <a:p>
-            <a:pPr marL="0" indent="0" algn="just">
-              <a:buNone/>
-            </a:pPr>
-            <a:r>
-              <a:rPr lang="pt-BR" sz="2000" dirty="0">
-                <a:latin typeface="Times New Roman" panose="02020603050405020304" pitchFamily="18" charset="0"/>
-                <a:cs typeface="Times New Roman" panose="02020603050405020304" pitchFamily="18" charset="0"/>
-              </a:rPr>
-              <a:t>	</a:t>
-            </a:r>
-          </a:p>
-          <a:p>
-            <a:pPr algn="just"/>
-            <a:endParaRPr lang="pt-BR" sz="2000" dirty="0">
-              <a:latin typeface="Times New Roman" panose="02020603050405020304" pitchFamily="18" charset="0"/>
-              <a:cs typeface="Times New Roman" panose="02020603050405020304" pitchFamily="18" charset="0"/>
-            </a:endParaRPr>
-          </a:p>
-          <a:p>
-            <a:pPr algn="just"/>
-            <a:endParaRPr lang="pt-BR" sz="2000" dirty="0">
-              <a:latin typeface="Times New Roman" panose="02020603050405020304" pitchFamily="18" charset="0"/>
-              <a:cs typeface="Times New Roman" panose="02020603050405020304" pitchFamily="18" charset="0"/>
-            </a:endParaRPr>
-          </a:p>
-          <a:p>
-            <a:pPr algn="just"/>
             <a:endParaRPr lang="pt-BR" sz="2000" dirty="0">
               <a:latin typeface="Calibri" panose="020F0502020204030204" pitchFamily="34" charset="0"/>
             </a:endParaRPr>
@@ -5339,17 +5338,176 @@
               <a:buNone/>
             </a:pPr>
             <a:r>
+              <a:rPr lang="pt-BR" sz="2000" b="1" dirty="0">
+                <a:latin typeface="Times New Roman" panose="02020603050405020304" pitchFamily="18" charset="0"/>
+                <a:cs typeface="Times New Roman" panose="02020603050405020304" pitchFamily="18" charset="0"/>
+              </a:rPr>
+              <a:t>2 -- Plataforma Bohr (</a:t>
+            </a:r>
+            <a:r>
               <a:rPr lang="pt-BR" sz="2000" dirty="0">
                 <a:latin typeface="Times New Roman" panose="02020603050405020304" pitchFamily="18" charset="0"/>
                 <a:cs typeface="Times New Roman" panose="02020603050405020304" pitchFamily="18" charset="0"/>
-              </a:rPr>
-              <a:t>Exercícios (Atividade Verificadora de Aprendizagem)</a:t>
-            </a:r>
+                <a:hlinkClick r:id="rId3"/>
+              </a:rPr>
+              <a:t>https://bohr.io/</a:t>
+            </a:r>
+            <a:r>
+              <a:rPr lang="pt-BR" sz="2000" b="1" dirty="0">
+                <a:latin typeface="Times New Roman" panose="02020603050405020304" pitchFamily="18" charset="0"/>
+                <a:cs typeface="Times New Roman" panose="02020603050405020304" pitchFamily="18" charset="0"/>
+              </a:rPr>
+              <a:t>)</a:t>
+            </a:r>
+            <a:r>
+              <a:rPr lang="pt-BR" sz="2000" dirty="0">
+                <a:latin typeface="Times New Roman" panose="02020603050405020304" pitchFamily="18" charset="0"/>
+                <a:cs typeface="Times New Roman" panose="02020603050405020304" pitchFamily="18" charset="0"/>
+              </a:rPr>
+              <a:t> </a:t>
+            </a:r>
+            <a:endParaRPr lang="pt-BR" sz="2000" b="1" dirty="0">
+              <a:latin typeface="Times New Roman" panose="02020603050405020304" pitchFamily="18" charset="0"/>
+              <a:cs typeface="Times New Roman" panose="02020603050405020304" pitchFamily="18" charset="0"/>
+            </a:endParaRPr>
           </a:p>
           <a:p>
             <a:pPr marL="0" indent="0" algn="just">
               <a:buNone/>
             </a:pPr>
+            <a:r>
+              <a:rPr lang="pt-BR" sz="2000" dirty="0">
+                <a:latin typeface="Times New Roman" panose="02020603050405020304" pitchFamily="18" charset="0"/>
+                <a:cs typeface="Times New Roman" panose="02020603050405020304" pitchFamily="18" charset="0"/>
+              </a:rPr>
+              <a:t>(Criar e fazer o </a:t>
+            </a:r>
+            <a:r>
+              <a:rPr lang="pt-BR" sz="2000" dirty="0" err="1">
+                <a:latin typeface="Times New Roman" panose="02020603050405020304" pitchFamily="18" charset="0"/>
+                <a:cs typeface="Times New Roman" panose="02020603050405020304" pitchFamily="18" charset="0"/>
+              </a:rPr>
+              <a:t>deploy</a:t>
+            </a:r>
+            <a:r>
+              <a:rPr lang="pt-BR" sz="2000" dirty="0">
+                <a:latin typeface="Times New Roman" panose="02020603050405020304" pitchFamily="18" charset="0"/>
+                <a:cs typeface="Times New Roman" panose="02020603050405020304" pitchFamily="18" charset="0"/>
+              </a:rPr>
+              <a:t> de uma app (</a:t>
+            </a:r>
+            <a:r>
+              <a:rPr lang="pt-BR" sz="2000" b="1" dirty="0" err="1">
+                <a:solidFill>
+                  <a:srgbClr val="FF0000"/>
+                </a:solidFill>
+                <a:latin typeface="Times New Roman" panose="02020603050405020304" pitchFamily="18" charset="0"/>
+                <a:cs typeface="Times New Roman" panose="02020603050405020304" pitchFamily="18" charset="0"/>
+              </a:rPr>
+              <a:t>template</a:t>
+            </a:r>
+            <a:r>
+              <a:rPr lang="pt-BR" sz="2000" b="1" dirty="0">
+                <a:solidFill>
+                  <a:srgbClr val="FF0000"/>
+                </a:solidFill>
+                <a:latin typeface="Times New Roman" panose="02020603050405020304" pitchFamily="18" charset="0"/>
+                <a:cs typeface="Times New Roman" panose="02020603050405020304" pitchFamily="18" charset="0"/>
+              </a:rPr>
+              <a:t> livre</a:t>
+            </a:r>
+            <a:r>
+              <a:rPr lang="pt-BR" sz="2000" dirty="0">
+                <a:latin typeface="Times New Roman" panose="02020603050405020304" pitchFamily="18" charset="0"/>
+                <a:cs typeface="Times New Roman" panose="02020603050405020304" pitchFamily="18" charset="0"/>
+              </a:rPr>
+              <a:t>) )</a:t>
+            </a:r>
+          </a:p>
+          <a:p>
+            <a:pPr marL="0" indent="0" algn="just">
+              <a:buNone/>
+            </a:pPr>
+            <a:r>
+              <a:rPr lang="pt-BR" sz="2000" dirty="0">
+                <a:latin typeface="Times New Roman" panose="02020603050405020304" pitchFamily="18" charset="0"/>
+                <a:cs typeface="Times New Roman" panose="02020603050405020304" pitchFamily="18" charset="0"/>
+              </a:rPr>
+              <a:t> </a:t>
+            </a:r>
+          </a:p>
+          <a:p>
+            <a:pPr marL="0" indent="0" algn="just">
+              <a:buNone/>
+            </a:pPr>
+            <a:r>
+              <a:rPr lang="pt-BR" sz="2000" b="1" dirty="0">
+                <a:latin typeface="Times New Roman" panose="02020603050405020304" pitchFamily="18" charset="0"/>
+                <a:cs typeface="Times New Roman" panose="02020603050405020304" pitchFamily="18" charset="0"/>
+              </a:rPr>
+              <a:t>3 – Plataforma </a:t>
+            </a:r>
+            <a:r>
+              <a:rPr lang="pt-BR" sz="2000" b="1" dirty="0" err="1">
+                <a:latin typeface="Times New Roman" panose="02020603050405020304" pitchFamily="18" charset="0"/>
+                <a:cs typeface="Times New Roman" panose="02020603050405020304" pitchFamily="18" charset="0"/>
+              </a:rPr>
+              <a:t>Netlify</a:t>
+            </a:r>
+            <a:r>
+              <a:rPr lang="pt-BR" sz="2000" b="1" dirty="0">
+                <a:latin typeface="Times New Roman" panose="02020603050405020304" pitchFamily="18" charset="0"/>
+                <a:cs typeface="Times New Roman" panose="02020603050405020304" pitchFamily="18" charset="0"/>
+              </a:rPr>
+              <a:t> (</a:t>
+            </a:r>
+            <a:r>
+              <a:rPr lang="pt-BR" sz="2000" dirty="0">
+                <a:latin typeface="Times New Roman" panose="02020603050405020304" pitchFamily="18" charset="0"/>
+                <a:cs typeface="Times New Roman" panose="02020603050405020304" pitchFamily="18" charset="0"/>
+                <a:hlinkClick r:id="rId4"/>
+              </a:rPr>
+              <a:t>https://www.netlify.com/</a:t>
+            </a:r>
+            <a:r>
+              <a:rPr lang="pt-BR" sz="2000" dirty="0">
+                <a:latin typeface="Times New Roman" panose="02020603050405020304" pitchFamily="18" charset="0"/>
+                <a:cs typeface="Times New Roman" panose="02020603050405020304" pitchFamily="18" charset="0"/>
+              </a:rPr>
+              <a:t>)</a:t>
+            </a:r>
+            <a:endParaRPr lang="pt-BR" sz="2000" b="1" dirty="0">
+              <a:latin typeface="Times New Roman" panose="02020603050405020304" pitchFamily="18" charset="0"/>
+              <a:cs typeface="Times New Roman" panose="02020603050405020304" pitchFamily="18" charset="0"/>
+            </a:endParaRPr>
+          </a:p>
+          <a:p>
+            <a:pPr marL="0" indent="0" algn="just">
+              <a:buNone/>
+            </a:pPr>
+            <a:r>
+              <a:rPr lang="pt-BR" sz="2000" dirty="0">
+                <a:latin typeface="Times New Roman" panose="02020603050405020304" pitchFamily="18" charset="0"/>
+                <a:cs typeface="Times New Roman" panose="02020603050405020304" pitchFamily="18" charset="0"/>
+                <a:hlinkClick r:id="rId5"/>
+              </a:rPr>
+              <a:t>https://github.com/</a:t>
+            </a:r>
+            <a:r>
+              <a:rPr lang="pt-BR" sz="2000" dirty="0">
+                <a:latin typeface="Times New Roman" panose="02020603050405020304" pitchFamily="18" charset="0"/>
+                <a:cs typeface="Times New Roman" panose="02020603050405020304" pitchFamily="18" charset="0"/>
+              </a:rPr>
+              <a:t> ; </a:t>
+            </a:r>
+            <a:r>
+              <a:rPr lang="pt-BR" sz="2000" dirty="0">
+                <a:latin typeface="Times New Roman" panose="02020603050405020304" pitchFamily="18" charset="0"/>
+                <a:cs typeface="Times New Roman" panose="02020603050405020304" pitchFamily="18" charset="0"/>
+                <a:hlinkClick r:id="rId6"/>
+              </a:rPr>
+              <a:t>https://git-scm.com/downloads</a:t>
+            </a:r>
             <a:endParaRPr lang="pt-BR" sz="2000" dirty="0">
               <a:latin typeface="Times New Roman" panose="02020603050405020304" pitchFamily="18" charset="0"/>
               <a:cs typeface="Times New Roman" panose="02020603050405020304" pitchFamily="18" charset="0"/>
@@ -5360,175 +5518,19 @@
               <a:buNone/>
             </a:pPr>
             <a:r>
-              <a:rPr lang="pt-BR" sz="2000" b="1" dirty="0">
-                <a:latin typeface="Times New Roman" panose="02020603050405020304" pitchFamily="18" charset="0"/>
-                <a:cs typeface="Times New Roman" panose="02020603050405020304" pitchFamily="18" charset="0"/>
-              </a:rPr>
-              <a:t>2 -- Plataforma Bohr (</a:t>
-            </a:r>
-            <a:r>
               <a:rPr lang="pt-BR" sz="2000" dirty="0">
                 <a:latin typeface="Times New Roman" panose="02020603050405020304" pitchFamily="18" charset="0"/>
                 <a:cs typeface="Times New Roman" panose="02020603050405020304" pitchFamily="18" charset="0"/>
-                <a:hlinkClick r:id="rId3"/>
-              </a:rPr>
-              <a:t>https://bohr.io/</a:t>
-            </a:r>
-            <a:r>
-              <a:rPr lang="pt-BR" sz="2000" b="1" dirty="0">
-                <a:latin typeface="Times New Roman" panose="02020603050405020304" pitchFamily="18" charset="0"/>
-                <a:cs typeface="Times New Roman" panose="02020603050405020304" pitchFamily="18" charset="0"/>
-              </a:rPr>
-              <a:t>)</a:t>
+              </a:rPr>
+              <a:t>	Tutorial:	 </a:t>
             </a:r>
             <a:r>
               <a:rPr lang="pt-BR" sz="2000" dirty="0">
                 <a:latin typeface="Times New Roman" panose="02020603050405020304" pitchFamily="18" charset="0"/>
                 <a:cs typeface="Times New Roman" panose="02020603050405020304" pitchFamily="18" charset="0"/>
-              </a:rPr>
-              <a:t> </a:t>
-            </a:r>
-            <a:endParaRPr lang="pt-BR" sz="2000" b="1" dirty="0">
-              <a:latin typeface="Times New Roman" panose="02020603050405020304" pitchFamily="18" charset="0"/>
-              <a:cs typeface="Times New Roman" panose="02020603050405020304" pitchFamily="18" charset="0"/>
-            </a:endParaRPr>
-          </a:p>
-          <a:p>
-            <a:pPr marL="0" indent="0" algn="just">
-              <a:buNone/>
-            </a:pPr>
-            <a:r>
-              <a:rPr lang="pt-BR" sz="2000" dirty="0">
-                <a:latin typeface="Times New Roman" panose="02020603050405020304" pitchFamily="18" charset="0"/>
-                <a:cs typeface="Times New Roman" panose="02020603050405020304" pitchFamily="18" charset="0"/>
-              </a:rPr>
-              <a:t>(Criar e fazer o </a:t>
-            </a:r>
-            <a:r>
-              <a:rPr lang="pt-BR" sz="2000" dirty="0" err="1">
-                <a:latin typeface="Times New Roman" panose="02020603050405020304" pitchFamily="18" charset="0"/>
-                <a:cs typeface="Times New Roman" panose="02020603050405020304" pitchFamily="18" charset="0"/>
-              </a:rPr>
-              <a:t>deploy</a:t>
-            </a:r>
-            <a:r>
-              <a:rPr lang="pt-BR" sz="2000" dirty="0">
-                <a:latin typeface="Times New Roman" panose="02020603050405020304" pitchFamily="18" charset="0"/>
-                <a:cs typeface="Times New Roman" panose="02020603050405020304" pitchFamily="18" charset="0"/>
-              </a:rPr>
-              <a:t> de uma app (</a:t>
-            </a:r>
-            <a:r>
-              <a:rPr lang="pt-BR" sz="2000" b="1" dirty="0" err="1">
-                <a:solidFill>
-                  <a:srgbClr val="FF0000"/>
-                </a:solidFill>
-                <a:latin typeface="Times New Roman" panose="02020603050405020304" pitchFamily="18" charset="0"/>
-                <a:cs typeface="Times New Roman" panose="02020603050405020304" pitchFamily="18" charset="0"/>
-              </a:rPr>
-              <a:t>template</a:t>
-            </a:r>
-            <a:r>
-              <a:rPr lang="pt-BR" sz="2000" b="1" dirty="0">
-                <a:solidFill>
-                  <a:srgbClr val="FF0000"/>
-                </a:solidFill>
-                <a:latin typeface="Times New Roman" panose="02020603050405020304" pitchFamily="18" charset="0"/>
-                <a:cs typeface="Times New Roman" panose="02020603050405020304" pitchFamily="18" charset="0"/>
-              </a:rPr>
-              <a:t> livre</a:t>
-            </a:r>
-            <a:r>
-              <a:rPr lang="pt-BR" sz="2000" dirty="0">
-                <a:latin typeface="Times New Roman" panose="02020603050405020304" pitchFamily="18" charset="0"/>
-                <a:cs typeface="Times New Roman" panose="02020603050405020304" pitchFamily="18" charset="0"/>
-              </a:rPr>
-              <a:t>) )</a:t>
-            </a:r>
-          </a:p>
-          <a:p>
-            <a:pPr marL="0" indent="0" algn="just">
-              <a:buNone/>
-            </a:pPr>
-            <a:r>
-              <a:rPr lang="pt-BR" sz="2000" dirty="0">
-                <a:latin typeface="Times New Roman" panose="02020603050405020304" pitchFamily="18" charset="0"/>
-                <a:cs typeface="Times New Roman" panose="02020603050405020304" pitchFamily="18" charset="0"/>
-              </a:rPr>
-              <a:t> </a:t>
-            </a:r>
-          </a:p>
-          <a:p>
-            <a:pPr marL="0" indent="0" algn="just">
-              <a:buNone/>
-            </a:pPr>
-            <a:r>
-              <a:rPr lang="pt-BR" sz="2000" b="1" dirty="0">
-                <a:latin typeface="Times New Roman" panose="02020603050405020304" pitchFamily="18" charset="0"/>
-                <a:cs typeface="Times New Roman" panose="02020603050405020304" pitchFamily="18" charset="0"/>
-              </a:rPr>
-              <a:t>3 – Plataforma </a:t>
-            </a:r>
-            <a:r>
-              <a:rPr lang="pt-BR" sz="2000" b="1" dirty="0" err="1">
-                <a:latin typeface="Times New Roman" panose="02020603050405020304" pitchFamily="18" charset="0"/>
-                <a:cs typeface="Times New Roman" panose="02020603050405020304" pitchFamily="18" charset="0"/>
-              </a:rPr>
-              <a:t>Netlify</a:t>
-            </a:r>
-            <a:r>
-              <a:rPr lang="pt-BR" sz="2000" b="1" dirty="0">
-                <a:latin typeface="Times New Roman" panose="02020603050405020304" pitchFamily="18" charset="0"/>
-                <a:cs typeface="Times New Roman" panose="02020603050405020304" pitchFamily="18" charset="0"/>
-              </a:rPr>
-              <a:t> (</a:t>
-            </a:r>
-            <a:r>
-              <a:rPr lang="pt-BR" sz="2000" dirty="0">
-                <a:latin typeface="Times New Roman" panose="02020603050405020304" pitchFamily="18" charset="0"/>
-                <a:cs typeface="Times New Roman" panose="02020603050405020304" pitchFamily="18" charset="0"/>
-                <a:hlinkClick r:id="rId4"/>
-              </a:rPr>
-              <a:t>https://www.netlify.com/</a:t>
-            </a:r>
-            <a:r>
-              <a:rPr lang="pt-BR" sz="2000" dirty="0">
-                <a:latin typeface="Times New Roman" panose="02020603050405020304" pitchFamily="18" charset="0"/>
-                <a:cs typeface="Times New Roman" panose="02020603050405020304" pitchFamily="18" charset="0"/>
-              </a:rPr>
-              <a:t>)</a:t>
-            </a:r>
-            <a:endParaRPr lang="pt-BR" sz="2000" b="1" dirty="0">
-              <a:latin typeface="Times New Roman" panose="02020603050405020304" pitchFamily="18" charset="0"/>
-              <a:cs typeface="Times New Roman" panose="02020603050405020304" pitchFamily="18" charset="0"/>
-            </a:endParaRPr>
-          </a:p>
-          <a:p>
-            <a:pPr marL="0" indent="0" algn="just">
-              <a:buNone/>
-            </a:pPr>
-            <a:r>
-              <a:rPr lang="pt-BR" sz="2000" dirty="0">
-                <a:latin typeface="Times New Roman" panose="02020603050405020304" pitchFamily="18" charset="0"/>
-                <a:cs typeface="Times New Roman" panose="02020603050405020304" pitchFamily="18" charset="0"/>
-                <a:hlinkClick r:id="rId5"/>
-              </a:rPr>
-              <a:t>https://github.com/</a:t>
-            </a:r>
-            <a:r>
-              <a:rPr lang="pt-BR" sz="2000" dirty="0">
-                <a:latin typeface="Times New Roman" panose="02020603050405020304" pitchFamily="18" charset="0"/>
-                <a:cs typeface="Times New Roman" panose="02020603050405020304" pitchFamily="18" charset="0"/>
-              </a:rPr>
-              <a:t> ; </a:t>
-            </a:r>
-            <a:r>
-              <a:rPr lang="pt-BR" sz="2000" dirty="0">
-                <a:latin typeface="Times New Roman" panose="02020603050405020304" pitchFamily="18" charset="0"/>
-                <a:cs typeface="Times New Roman" panose="02020603050405020304" pitchFamily="18" charset="0"/>
-                <a:hlinkClick r:id="rId6"/>
-              </a:rPr>
-              <a:t>https://git-scm.com/downloads</a:t>
+                <a:hlinkClick r:id="rId7"/>
+              </a:rPr>
+              <a:t>https://ostechnix.com/what-is-git-and-how-to-install-git-in-linux/</a:t>
             </a:r>
             <a:endParaRPr lang="pt-BR" sz="2000" dirty="0">
               <a:latin typeface="Times New Roman" panose="02020603050405020304" pitchFamily="18" charset="0"/>
@@ -5544,15 +5546,15 @@
                 <a:latin typeface="Times New Roman" panose="02020603050405020304" pitchFamily="18" charset="0"/>
                 <a:cs typeface="Times New Roman" panose="02020603050405020304" pitchFamily="18" charset="0"/>
               </a:rPr>
-              <a:t>	Tutorial:	 </a:t>
+              <a:t>			 </a:t>
             </a:r>
             <a:r>
               <a:rPr lang="pt-BR" sz="2000" dirty="0">
                 <a:latin typeface="Times New Roman" panose="02020603050405020304" pitchFamily="18" charset="0"/>
                 <a:cs typeface="Times New Roman" panose="02020603050405020304" pitchFamily="18" charset="0"/>
-                <a:hlinkClick r:id="rId7"/>
-              </a:rPr>
-              <a:t>https://ostechnix.com/what-is-git-and-how-to-install-git-in-linux/</a:t>
+                <a:hlinkClick r:id="rId8"/>
+              </a:rPr>
+              <a:t>https://chiamakaikeanyi.dev/working-with-git/</a:t>
             </a:r>
             <a:endParaRPr lang="pt-BR" sz="2000" dirty="0">
               <a:latin typeface="Times New Roman" panose="02020603050405020304" pitchFamily="18" charset="0"/>
@@ -5568,95 +5570,49 @@
                 <a:latin typeface="Times New Roman" panose="02020603050405020304" pitchFamily="18" charset="0"/>
                 <a:cs typeface="Times New Roman" panose="02020603050405020304" pitchFamily="18" charset="0"/>
               </a:rPr>
-              <a:t>			 </a:t>
+              <a:t>Criar e fazer o </a:t>
+            </a:r>
+            <a:r>
+              <a:rPr lang="pt-BR" sz="2000" dirty="0" err="1">
+                <a:latin typeface="Times New Roman" panose="02020603050405020304" pitchFamily="18" charset="0"/>
+                <a:cs typeface="Times New Roman" panose="02020603050405020304" pitchFamily="18" charset="0"/>
+              </a:rPr>
+              <a:t>deploy</a:t>
             </a:r>
             <a:r>
               <a:rPr lang="pt-BR" sz="2000" dirty="0">
                 <a:latin typeface="Times New Roman" panose="02020603050405020304" pitchFamily="18" charset="0"/>
                 <a:cs typeface="Times New Roman" panose="02020603050405020304" pitchFamily="18" charset="0"/>
-                <a:hlinkClick r:id="rId8"/>
-              </a:rPr>
-              <a:t>https://chiamakaikeanyi.dev/working-with-git/</a:t>
-            </a:r>
-            <a:endParaRPr lang="pt-BR" sz="2000" dirty="0">
-              <a:latin typeface="Times New Roman" panose="02020603050405020304" pitchFamily="18" charset="0"/>
-              <a:cs typeface="Times New Roman" panose="02020603050405020304" pitchFamily="18" charset="0"/>
-            </a:endParaRPr>
-          </a:p>
-          <a:p>
-            <a:pPr marL="0" indent="0" algn="just">
-              <a:buNone/>
-            </a:pPr>
+              </a:rPr>
+              <a:t> de uma app (</a:t>
+            </a:r>
+            <a:r>
+              <a:rPr lang="pt-BR" sz="2000" b="1" dirty="0" err="1">
+                <a:solidFill>
+                  <a:srgbClr val="FF0000"/>
+                </a:solidFill>
+                <a:latin typeface="Times New Roman" panose="02020603050405020304" pitchFamily="18" charset="0"/>
+                <a:cs typeface="Times New Roman" panose="02020603050405020304" pitchFamily="18" charset="0"/>
+              </a:rPr>
+              <a:t>template</a:t>
+            </a:r>
+            <a:r>
+              <a:rPr lang="pt-BR" sz="2000" b="1" dirty="0">
+                <a:solidFill>
+                  <a:srgbClr val="FF0000"/>
+                </a:solidFill>
+                <a:latin typeface="Times New Roman" panose="02020603050405020304" pitchFamily="18" charset="0"/>
+                <a:cs typeface="Times New Roman" panose="02020603050405020304" pitchFamily="18" charset="0"/>
+              </a:rPr>
+              <a:t> livre</a:t>
+            </a:r>
             <a:r>
               <a:rPr lang="pt-BR" sz="2000" dirty="0">
                 <a:latin typeface="Times New Roman" panose="02020603050405020304" pitchFamily="18" charset="0"/>
                 <a:cs typeface="Times New Roman" panose="02020603050405020304" pitchFamily="18" charset="0"/>
               </a:rPr>
-              <a:t>Criar e fazer o </a:t>
-            </a:r>
-            <a:r>
-              <a:rPr lang="pt-BR" sz="2000" dirty="0" err="1">
-                <a:latin typeface="Times New Roman" panose="02020603050405020304" pitchFamily="18" charset="0"/>
-                <a:cs typeface="Times New Roman" panose="02020603050405020304" pitchFamily="18" charset="0"/>
-              </a:rPr>
-              <a:t>deploy</a:t>
-            </a:r>
-            <a:r>
-              <a:rPr lang="pt-BR" sz="2000" dirty="0">
-                <a:latin typeface="Times New Roman" panose="02020603050405020304" pitchFamily="18" charset="0"/>
-                <a:cs typeface="Times New Roman" panose="02020603050405020304" pitchFamily="18" charset="0"/>
-              </a:rPr>
-              <a:t> de uma app (</a:t>
-            </a:r>
-            <a:r>
-              <a:rPr lang="pt-BR" sz="2000" b="1" dirty="0" err="1">
-                <a:solidFill>
-                  <a:srgbClr val="FF0000"/>
-                </a:solidFill>
-                <a:latin typeface="Times New Roman" panose="02020603050405020304" pitchFamily="18" charset="0"/>
-                <a:cs typeface="Times New Roman" panose="02020603050405020304" pitchFamily="18" charset="0"/>
-              </a:rPr>
-              <a:t>template</a:t>
-            </a:r>
-            <a:r>
-              <a:rPr lang="pt-BR" sz="2000" b="1" dirty="0">
-                <a:solidFill>
-                  <a:srgbClr val="FF0000"/>
-                </a:solidFill>
-                <a:latin typeface="Times New Roman" panose="02020603050405020304" pitchFamily="18" charset="0"/>
-                <a:cs typeface="Times New Roman" panose="02020603050405020304" pitchFamily="18" charset="0"/>
-              </a:rPr>
-              <a:t> livre</a:t>
-            </a:r>
-            <a:r>
-              <a:rPr lang="pt-BR" sz="2000" dirty="0">
-                <a:latin typeface="Times New Roman" panose="02020603050405020304" pitchFamily="18" charset="0"/>
-                <a:cs typeface="Times New Roman" panose="02020603050405020304" pitchFamily="18" charset="0"/>
-              </a:rPr>
               <a:t>)</a:t>
             </a:r>
-            <a:endParaRPr lang="pt-BR" sz="2000" dirty="0">
-              <a:latin typeface="Calibri" panose="020F0502020204030204" pitchFamily="34" charset="0"/>
-            </a:endParaRPr>
-          </a:p>
-          <a:p>
-            <a:pPr marL="0" indent="0" algn="just">
-              <a:buNone/>
-            </a:pPr>
-            <a:endParaRPr lang="pt-BR" sz="2000" dirty="0">
-              <a:latin typeface="Times New Roman" panose="02020603050405020304" pitchFamily="18" charset="0"/>
-              <a:cs typeface="Times New Roman" panose="02020603050405020304" pitchFamily="18" charset="0"/>
-            </a:endParaRPr>
-          </a:p>
-          <a:p>
-            <a:pPr algn="just"/>
-            <a:endParaRPr lang="pt-BR" sz="2000" dirty="0">
-              <a:latin typeface="Times New Roman" panose="02020603050405020304" pitchFamily="18" charset="0"/>
-              <a:cs typeface="Times New Roman" panose="02020603050405020304" pitchFamily="18" charset="0"/>
-            </a:endParaRPr>
-          </a:p>
-          <a:p>
-            <a:pPr algn="just"/>
             <a:endParaRPr lang="pt-BR" sz="2000" dirty="0">
               <a:latin typeface="Calibri" panose="020F0502020204030204" pitchFamily="34" charset="0"/>
             </a:endParaRPr>
@@ -5769,27 +5725,6 @@
             <a:noAutofit/>
           </a:bodyPr>
           <a:lstStyle/>
-          <a:p>
-            <a:pPr marL="0" indent="0" algn="just">
-              <a:buNone/>
-            </a:pPr>
-            <a:r>
-              <a:rPr lang="pt-BR" sz="2000" dirty="0">
-                <a:latin typeface="Times New Roman" panose="02020603050405020304" pitchFamily="18" charset="0"/>
-                <a:cs typeface="Times New Roman" panose="02020603050405020304" pitchFamily="18" charset="0"/>
-              </a:rPr>
-              <a:t>Exercícios (Atividade Verificadora de Aprendizagem)</a:t>
-            </a:r>
-          </a:p>
-          <a:p>
-            <a:pPr marL="0" indent="0" algn="just">
-              <a:buNone/>
-            </a:pPr>
-            <a:endParaRPr lang="pt-BR" sz="2000" dirty="0">
-              <a:latin typeface="Times New Roman" panose="02020603050405020304" pitchFamily="18" charset="0"/>
-              <a:cs typeface="Times New Roman" panose="02020603050405020304" pitchFamily="18" charset="0"/>
-            </a:endParaRPr>
-          </a:p>
           <a:p>
             <a:pPr marL="0" indent="0" algn="just">
               <a:buNone/>
@@ -7990,7 +7925,7 @@
               </a:tabLst>
             </a:pPr>
             <a:r>
-              <a:rPr lang="pt-BR" sz="1600" dirty="0">
+              <a:rPr lang="pt-BR" sz="2000" b="1" dirty="0">
                 <a:latin typeface="Times" panose="02020603050405020304" pitchFamily="18" charset="0"/>
                 <a:ea typeface="Times New Roman" panose="02020603050405020304" pitchFamily="18" charset="0"/>
                 <a:cs typeface="Times New Roman" panose="02020603050405020304" pitchFamily="18" charset="0"/>

</xml_diff>